<commit_message>
se subio la informacioon
</commit_message>
<xml_diff>
--- a/2015-2016/clases/informatica_aplicada/clase_3/Clase_3.pptx
+++ b/2015-2016/clases/informatica_aplicada/clase_3/Clase_3.pptx
@@ -184,7 +184,7 @@
           <a:p>
             <a:fld id="{7A847CFC-816F-41D0-AAC0-9BF4FEBC753E}" type="datetimeFigureOut">
               <a:rPr lang="es-ES" smtClean="0"/>
-              <a:t>20/05/2015</a:t>
+              <a:t>23/05/2015</a:t>
             </a:fld>
             <a:endParaRPr lang="es-ES"/>
           </a:p>
@@ -709,7 +709,7 @@
           <a:p>
             <a:fld id="{7A847CFC-816F-41D0-AAC0-9BF4FEBC753E}" type="datetimeFigureOut">
               <a:rPr lang="es-ES" smtClean="0"/>
-              <a:t>20/05/2015</a:t>
+              <a:t>23/05/2015</a:t>
             </a:fld>
             <a:endParaRPr lang="es-ES"/>
           </a:p>
@@ -1023,7 +1023,7 @@
           <a:p>
             <a:fld id="{7A847CFC-816F-41D0-AAC0-9BF4FEBC753E}" type="datetimeFigureOut">
               <a:rPr lang="es-ES" smtClean="0"/>
-              <a:t>20/05/2015</a:t>
+              <a:t>23/05/2015</a:t>
             </a:fld>
             <a:endParaRPr lang="es-ES"/>
           </a:p>
@@ -1309,7 +1309,7 @@
           <a:p>
             <a:fld id="{7A847CFC-816F-41D0-AAC0-9BF4FEBC753E}" type="datetimeFigureOut">
               <a:rPr lang="es-ES" smtClean="0"/>
-              <a:t>20/05/2015</a:t>
+              <a:t>23/05/2015</a:t>
             </a:fld>
             <a:endParaRPr lang="es-ES"/>
           </a:p>
@@ -1884,7 +1884,7 @@
           <a:p>
             <a:fld id="{7A847CFC-816F-41D0-AAC0-9BF4FEBC753E}" type="datetimeFigureOut">
               <a:rPr lang="es-ES" smtClean="0"/>
-              <a:t>20/05/2015</a:t>
+              <a:t>23/05/2015</a:t>
             </a:fld>
             <a:endParaRPr lang="es-ES"/>
           </a:p>
@@ -1974,7 +1974,7 @@
           <a:p>
             <a:fld id="{7A847CFC-816F-41D0-AAC0-9BF4FEBC753E}" type="datetimeFigureOut">
               <a:rPr lang="es-ES" smtClean="0"/>
-              <a:t>20/05/2015</a:t>
+              <a:t>23/05/2015</a:t>
             </a:fld>
             <a:endParaRPr lang="es-ES"/>
           </a:p>
@@ -2683,7 +2683,7 @@
           <a:p>
             <a:fld id="{7A847CFC-816F-41D0-AAC0-9BF4FEBC753E}" type="datetimeFigureOut">
               <a:rPr lang="es-ES" smtClean="0"/>
-              <a:t>20/05/2015</a:t>
+              <a:t>23/05/2015</a:t>
             </a:fld>
             <a:endParaRPr lang="es-ES"/>
           </a:p>
@@ -2935,7 +2935,7 @@
           <a:p>
             <a:fld id="{7A847CFC-816F-41D0-AAC0-9BF4FEBC753E}" type="datetimeFigureOut">
               <a:rPr lang="es-ES" smtClean="0"/>
-              <a:t>20/05/2015</a:t>
+              <a:t>23/05/2015</a:t>
             </a:fld>
             <a:endParaRPr lang="es-ES"/>
           </a:p>
@@ -3164,7 +3164,7 @@
           <a:p>
             <a:fld id="{7A847CFC-816F-41D0-AAC0-9BF4FEBC753E}" type="datetimeFigureOut">
               <a:rPr lang="es-ES" smtClean="0"/>
-              <a:t>20/05/2015</a:t>
+              <a:t>23/05/2015</a:t>
             </a:fld>
             <a:endParaRPr lang="es-ES"/>
           </a:p>
@@ -3438,7 +3438,7 @@
           <a:p>
             <a:fld id="{7A847CFC-816F-41D0-AAC0-9BF4FEBC753E}" type="datetimeFigureOut">
               <a:rPr lang="es-ES" smtClean="0"/>
-              <a:t>20/05/2015</a:t>
+              <a:t>23/05/2015</a:t>
             </a:fld>
             <a:endParaRPr lang="es-ES"/>
           </a:p>
@@ -3724,7 +3724,7 @@
           <a:p>
             <a:fld id="{7A847CFC-816F-41D0-AAC0-9BF4FEBC753E}" type="datetimeFigureOut">
               <a:rPr lang="es-ES" smtClean="0"/>
-              <a:t>20/05/2015</a:t>
+              <a:t>23/05/2015</a:t>
             </a:fld>
             <a:endParaRPr lang="es-ES"/>
           </a:p>
@@ -3992,7 +3992,7 @@
           <a:p>
             <a:fld id="{7A847CFC-816F-41D0-AAC0-9BF4FEBC753E}" type="datetimeFigureOut">
               <a:rPr lang="es-ES" smtClean="0"/>
-              <a:t>20/05/2015</a:t>
+              <a:t>23/05/2015</a:t>
             </a:fld>
             <a:endParaRPr lang="es-ES"/>
           </a:p>

</xml_diff>

<commit_message>
se termino bien los syllabus
</commit_message>
<xml_diff>
--- a/2015-2016/clases/informatica_aplicada/clase_3/Clase_3.pptx
+++ b/2015-2016/clases/informatica_aplicada/clase_3/Clase_3.pptx
@@ -184,7 +184,7 @@
           <a:p>
             <a:fld id="{7A847CFC-816F-41D0-AAC0-9BF4FEBC753E}" type="datetimeFigureOut">
               <a:rPr lang="es-ES" smtClean="0"/>
-              <a:t>23/05/2015</a:t>
+              <a:t>27/05/2015</a:t>
             </a:fld>
             <a:endParaRPr lang="es-ES"/>
           </a:p>
@@ -709,7 +709,7 @@
           <a:p>
             <a:fld id="{7A847CFC-816F-41D0-AAC0-9BF4FEBC753E}" type="datetimeFigureOut">
               <a:rPr lang="es-ES" smtClean="0"/>
-              <a:t>23/05/2015</a:t>
+              <a:t>27/05/2015</a:t>
             </a:fld>
             <a:endParaRPr lang="es-ES"/>
           </a:p>
@@ -1023,7 +1023,7 @@
           <a:p>
             <a:fld id="{7A847CFC-816F-41D0-AAC0-9BF4FEBC753E}" type="datetimeFigureOut">
               <a:rPr lang="es-ES" smtClean="0"/>
-              <a:t>23/05/2015</a:t>
+              <a:t>27/05/2015</a:t>
             </a:fld>
             <a:endParaRPr lang="es-ES"/>
           </a:p>
@@ -1309,7 +1309,7 @@
           <a:p>
             <a:fld id="{7A847CFC-816F-41D0-AAC0-9BF4FEBC753E}" type="datetimeFigureOut">
               <a:rPr lang="es-ES" smtClean="0"/>
-              <a:t>23/05/2015</a:t>
+              <a:t>27/05/2015</a:t>
             </a:fld>
             <a:endParaRPr lang="es-ES"/>
           </a:p>
@@ -1884,7 +1884,7 @@
           <a:p>
             <a:fld id="{7A847CFC-816F-41D0-AAC0-9BF4FEBC753E}" type="datetimeFigureOut">
               <a:rPr lang="es-ES" smtClean="0"/>
-              <a:t>23/05/2015</a:t>
+              <a:t>27/05/2015</a:t>
             </a:fld>
             <a:endParaRPr lang="es-ES"/>
           </a:p>
@@ -1974,7 +1974,7 @@
           <a:p>
             <a:fld id="{7A847CFC-816F-41D0-AAC0-9BF4FEBC753E}" type="datetimeFigureOut">
               <a:rPr lang="es-ES" smtClean="0"/>
-              <a:t>23/05/2015</a:t>
+              <a:t>27/05/2015</a:t>
             </a:fld>
             <a:endParaRPr lang="es-ES"/>
           </a:p>
@@ -2683,7 +2683,7 @@
           <a:p>
             <a:fld id="{7A847CFC-816F-41D0-AAC0-9BF4FEBC753E}" type="datetimeFigureOut">
               <a:rPr lang="es-ES" smtClean="0"/>
-              <a:t>23/05/2015</a:t>
+              <a:t>27/05/2015</a:t>
             </a:fld>
             <a:endParaRPr lang="es-ES"/>
           </a:p>
@@ -2935,7 +2935,7 @@
           <a:p>
             <a:fld id="{7A847CFC-816F-41D0-AAC0-9BF4FEBC753E}" type="datetimeFigureOut">
               <a:rPr lang="es-ES" smtClean="0"/>
-              <a:t>23/05/2015</a:t>
+              <a:t>27/05/2015</a:t>
             </a:fld>
             <a:endParaRPr lang="es-ES"/>
           </a:p>
@@ -3164,7 +3164,7 @@
           <a:p>
             <a:fld id="{7A847CFC-816F-41D0-AAC0-9BF4FEBC753E}" type="datetimeFigureOut">
               <a:rPr lang="es-ES" smtClean="0"/>
-              <a:t>23/05/2015</a:t>
+              <a:t>27/05/2015</a:t>
             </a:fld>
             <a:endParaRPr lang="es-ES"/>
           </a:p>
@@ -3438,7 +3438,7 @@
           <a:p>
             <a:fld id="{7A847CFC-816F-41D0-AAC0-9BF4FEBC753E}" type="datetimeFigureOut">
               <a:rPr lang="es-ES" smtClean="0"/>
-              <a:t>23/05/2015</a:t>
+              <a:t>27/05/2015</a:t>
             </a:fld>
             <a:endParaRPr lang="es-ES"/>
           </a:p>
@@ -3724,7 +3724,7 @@
           <a:p>
             <a:fld id="{7A847CFC-816F-41D0-AAC0-9BF4FEBC753E}" type="datetimeFigureOut">
               <a:rPr lang="es-ES" smtClean="0"/>
-              <a:t>23/05/2015</a:t>
+              <a:t>27/05/2015</a:t>
             </a:fld>
             <a:endParaRPr lang="es-ES"/>
           </a:p>
@@ -3992,7 +3992,7 @@
           <a:p>
             <a:fld id="{7A847CFC-816F-41D0-AAC0-9BF4FEBC753E}" type="datetimeFigureOut">
               <a:rPr lang="es-ES" smtClean="0"/>
-              <a:t>23/05/2015</a:t>
+              <a:t>27/05/2015</a:t>
             </a:fld>
             <a:endParaRPr lang="es-ES"/>
           </a:p>

</xml_diff>